<commit_message>
updated presentation and fixed typo
</commit_message>
<xml_diff>
--- a/final-presentation.pptx
+++ b/final-presentation.pptx
@@ -5,7 +5,7 @@
     <p:sldMasterId id="2147483660" r:id="rId1"/>
   </p:sldMasterIdLst>
   <p:notesMasterIdLst>
-    <p:notesMasterId r:id="rId14"/>
+    <p:notesMasterId r:id="rId17"/>
   </p:notesMasterIdLst>
   <p:sldIdLst>
     <p:sldId id="256" r:id="rId2"/>
@@ -15,11 +15,14 @@
     <p:sldId id="263" r:id="rId6"/>
     <p:sldId id="257" r:id="rId7"/>
     <p:sldId id="264" r:id="rId8"/>
-    <p:sldId id="265" r:id="rId9"/>
-    <p:sldId id="268" r:id="rId10"/>
-    <p:sldId id="266" r:id="rId11"/>
-    <p:sldId id="267" r:id="rId12"/>
-    <p:sldId id="259" r:id="rId13"/>
+    <p:sldId id="268" r:id="rId9"/>
+    <p:sldId id="270" r:id="rId10"/>
+    <p:sldId id="271" r:id="rId11"/>
+    <p:sldId id="265" r:id="rId12"/>
+    <p:sldId id="269" r:id="rId13"/>
+    <p:sldId id="266" r:id="rId14"/>
+    <p:sldId id="267" r:id="rId15"/>
+    <p:sldId id="259" r:id="rId16"/>
   </p:sldIdLst>
   <p:sldSz cx="12192000" cy="6858000"/>
   <p:notesSz cx="6858000" cy="9144000"/>
@@ -208,7 +211,7 @@
           <a:p>
             <a:fld id="{FE6C84CA-683E-42DB-A12D-E6F2DC5AC556}" type="datetimeFigureOut">
               <a:rPr lang="en-US" smtClean="0"/>
-              <a:t>1/7/2020</a:t>
+              <a:t>1/16/2020</a:t>
             </a:fld>
             <a:endParaRPr lang="en-US"/>
           </a:p>
@@ -6717,7 +6720,7 @@
           <p:cNvPr id="2" name="Titel 1">
             <a:extLst>
               <a:ext uri="{FF2B5EF4-FFF2-40B4-BE49-F238E27FC236}">
-                <a16:creationId xmlns:a16="http://schemas.microsoft.com/office/drawing/2014/main" id="{D89984BC-AC1B-422F-A5D0-159C7FA158A1}"/>
+                <a16:creationId xmlns:a16="http://schemas.microsoft.com/office/drawing/2014/main" id="{1BB66EA5-6D85-4FF6-8325-955AE8089A37}"/>
               </a:ext>
             </a:extLst>
           </p:cNvPr>
@@ -6735,7 +6738,7 @@
           <a:p>
             <a:r>
               <a:rPr lang="de-DE" dirty="0"/>
-              <a:t>Coq Beispiel</a:t>
+              <a:t>Coq</a:t>
             </a:r>
             <a:endParaRPr lang="en-US" dirty="0"/>
           </a:p>
@@ -6746,7 +6749,7 @@
           <p:cNvPr id="3" name="Inhaltsplatzhalter 2">
             <a:extLst>
               <a:ext uri="{FF2B5EF4-FFF2-40B4-BE49-F238E27FC236}">
-                <a16:creationId xmlns:a16="http://schemas.microsoft.com/office/drawing/2014/main" id="{9F54BA48-13BB-474F-869A-BFC365DB3C8A}"/>
+                <a16:creationId xmlns:a16="http://schemas.microsoft.com/office/drawing/2014/main" id="{9112029A-EACE-43A5-A4D8-C12AD4394E0C}"/>
               </a:ext>
             </a:extLst>
           </p:cNvPr>
@@ -6762,7 +6765,44 @@
           <a:bodyPr/>
           <a:lstStyle/>
           <a:p>
-            <a:endParaRPr lang="en-US"/>
+            <a:r>
+              <a:rPr lang="de-DE" dirty="0"/>
+              <a:t>existiert seit 1984</a:t>
+            </a:r>
+          </a:p>
+          <a:p>
+            <a:r>
+              <a:rPr lang="de-DE" dirty="0"/>
+              <a:t>wird von INRIA entwickelt</a:t>
+            </a:r>
+          </a:p>
+          <a:p>
+            <a:r>
+              <a:rPr lang="de-DE" dirty="0"/>
+              <a:t>ist open-source</a:t>
+            </a:r>
+          </a:p>
+          <a:p>
+            <a:r>
+              <a:rPr lang="de-DE" dirty="0"/>
+              <a:t>ist in </a:t>
+            </a:r>
+            <a:r>
+              <a:rPr lang="de-DE" dirty="0" err="1"/>
+              <a:t>Objective</a:t>
+            </a:r>
+            <a:r>
+              <a:rPr lang="de-DE" dirty="0"/>
+              <a:t> CAML (</a:t>
+            </a:r>
+            <a:r>
+              <a:rPr lang="de-DE" dirty="0" err="1"/>
+              <a:t>Ocaml</a:t>
+            </a:r>
+            <a:r>
+              <a:rPr lang="de-DE" dirty="0"/>
+              <a:t>) geschrieben</a:t>
+            </a:r>
           </a:p>
         </p:txBody>
       </p:sp>
@@ -6771,7 +6811,7 @@
           <p:cNvPr id="4" name="Datumsplatzhalter 3">
             <a:extLst>
               <a:ext uri="{FF2B5EF4-FFF2-40B4-BE49-F238E27FC236}">
-                <a16:creationId xmlns:a16="http://schemas.microsoft.com/office/drawing/2014/main" id="{99B7E53F-EA43-4D13-9D0B-129F9186262A}"/>
+                <a16:creationId xmlns:a16="http://schemas.microsoft.com/office/drawing/2014/main" id="{D36E6D87-0F44-490B-A994-02641D08EABB}"/>
               </a:ext>
             </a:extLst>
           </p:cNvPr>
@@ -6798,7 +6838,7 @@
     </p:spTree>
     <p:extLst>
       <p:ext uri="{BB962C8B-B14F-4D97-AF65-F5344CB8AC3E}">
-        <p14:creationId xmlns:p14="http://schemas.microsoft.com/office/powerpoint/2010/main" val="855517724"/>
+        <p14:creationId xmlns:p14="http://schemas.microsoft.com/office/powerpoint/2010/main" val="2730385089"/>
       </p:ext>
     </p:extLst>
   </p:cSld>
@@ -6847,6 +6887,408 @@
           <a:lstStyle/>
           <a:p>
             <a:r>
+              <a:rPr lang="de-DE" dirty="0" err="1"/>
+              <a:t>Dependent</a:t>
+            </a:r>
+            <a:r>
+              <a:rPr lang="de-DE" dirty="0"/>
+              <a:t> Type Sprache</a:t>
+            </a:r>
+            <a:endParaRPr lang="en-US" dirty="0"/>
+          </a:p>
+        </p:txBody>
+      </p:sp>
+      <p:sp>
+        <p:nvSpPr>
+          <p:cNvPr id="3" name="Inhaltsplatzhalter 2">
+            <a:extLst>
+              <a:ext uri="{FF2B5EF4-FFF2-40B4-BE49-F238E27FC236}">
+                <a16:creationId xmlns:a16="http://schemas.microsoft.com/office/drawing/2014/main" id="{9F54BA48-13BB-474F-869A-BFC365DB3C8A}"/>
+              </a:ext>
+            </a:extLst>
+          </p:cNvPr>
+          <p:cNvSpPr>
+            <a:spLocks noGrp="1"/>
+          </p:cNvSpPr>
+          <p:nvPr>
+            <p:ph idx="1"/>
+          </p:nvPr>
+        </p:nvSpPr>
+        <p:spPr/>
+        <p:txBody>
+          <a:bodyPr/>
+          <a:lstStyle/>
+          <a:p>
+            <a:pPr marL="0" indent="0">
+              <a:buNone/>
+            </a:pPr>
+            <a:r>
+              <a:rPr lang="en-US" dirty="0"/>
+              <a:t>public void </a:t>
+            </a:r>
+            <a:r>
+              <a:rPr lang="en-US" dirty="0" err="1"/>
+              <a:t>doSomething</a:t>
+            </a:r>
+            <a:r>
+              <a:rPr lang="en-US" dirty="0"/>
+              <a:t>(User user) {</a:t>
+            </a:r>
+          </a:p>
+          <a:p>
+            <a:pPr marL="0" indent="0">
+              <a:buNone/>
+            </a:pPr>
+            <a:r>
+              <a:rPr lang="en-US" dirty="0"/>
+              <a:t>	if(user == null) {</a:t>
+            </a:r>
+          </a:p>
+          <a:p>
+            <a:pPr marL="0" indent="0">
+              <a:buNone/>
+            </a:pPr>
+            <a:r>
+              <a:rPr lang="en-US" dirty="0"/>
+              <a:t>		throw new Exception("Received empty user!");</a:t>
+            </a:r>
+          </a:p>
+          <a:p>
+            <a:pPr marL="0" indent="0">
+              <a:buNone/>
+            </a:pPr>
+            <a:r>
+              <a:rPr lang="en-US" dirty="0"/>
+              <a:t>	}</a:t>
+            </a:r>
+          </a:p>
+          <a:p>
+            <a:pPr marL="0" indent="0">
+              <a:buNone/>
+            </a:pPr>
+            <a:r>
+              <a:rPr lang="en-US" dirty="0"/>
+              <a:t>...</a:t>
+            </a:r>
+          </a:p>
+          <a:p>
+            <a:pPr marL="0" indent="0">
+              <a:buNone/>
+            </a:pPr>
+            <a:r>
+              <a:rPr lang="en-US" dirty="0"/>
+              <a:t>}</a:t>
+            </a:r>
+          </a:p>
+        </p:txBody>
+      </p:sp>
+      <p:sp>
+        <p:nvSpPr>
+          <p:cNvPr id="4" name="Datumsplatzhalter 3">
+            <a:extLst>
+              <a:ext uri="{FF2B5EF4-FFF2-40B4-BE49-F238E27FC236}">
+                <a16:creationId xmlns:a16="http://schemas.microsoft.com/office/drawing/2014/main" id="{99B7E53F-EA43-4D13-9D0B-129F9186262A}"/>
+              </a:ext>
+            </a:extLst>
+          </p:cNvPr>
+          <p:cNvSpPr>
+            <a:spLocks noGrp="1"/>
+          </p:cNvSpPr>
+          <p:nvPr>
+            <p:ph type="dt" sz="half" idx="10"/>
+          </p:nvPr>
+        </p:nvSpPr>
+        <p:spPr/>
+        <p:txBody>
+          <a:bodyPr/>
+          <a:lstStyle/>
+          <a:p>
+            <a:r>
+              <a:rPr lang="de-DE"/>
+              <a:t>21/01/2020</a:t>
+            </a:r>
+            <a:endParaRPr lang="en-US"/>
+          </a:p>
+        </p:txBody>
+      </p:sp>
+    </p:spTree>
+    <p:extLst>
+      <p:ext uri="{BB962C8B-B14F-4D97-AF65-F5344CB8AC3E}">
+        <p14:creationId xmlns:p14="http://schemas.microsoft.com/office/powerpoint/2010/main" val="904615250"/>
+      </p:ext>
+    </p:extLst>
+  </p:cSld>
+  <p:clrMapOvr>
+    <a:masterClrMapping/>
+  </p:clrMapOvr>
+</p:sld>
+</file>
+
+<file path=ppt/slides/slide12.xml><?xml version="1.0" encoding="utf-8"?>
+<p:sld xmlns:a="http://schemas.openxmlformats.org/drawingml/2006/main" xmlns:r="http://schemas.openxmlformats.org/officeDocument/2006/relationships" xmlns:p="http://schemas.openxmlformats.org/presentationml/2006/main">
+  <p:cSld>
+    <p:spTree>
+      <p:nvGrpSpPr>
+        <p:cNvPr id="1" name=""/>
+        <p:cNvGrpSpPr/>
+        <p:nvPr/>
+      </p:nvGrpSpPr>
+      <p:grpSpPr>
+        <a:xfrm>
+          <a:off x="0" y="0"/>
+          <a:ext cx="0" cy="0"/>
+          <a:chOff x="0" y="0"/>
+          <a:chExt cx="0" cy="0"/>
+        </a:xfrm>
+      </p:grpSpPr>
+      <p:sp>
+        <p:nvSpPr>
+          <p:cNvPr id="2" name="Titel 1">
+            <a:extLst>
+              <a:ext uri="{FF2B5EF4-FFF2-40B4-BE49-F238E27FC236}">
+                <a16:creationId xmlns:a16="http://schemas.microsoft.com/office/drawing/2014/main" id="{D89984BC-AC1B-422F-A5D0-159C7FA158A1}"/>
+              </a:ext>
+            </a:extLst>
+          </p:cNvPr>
+          <p:cNvSpPr>
+            <a:spLocks noGrp="1"/>
+          </p:cNvSpPr>
+          <p:nvPr>
+            <p:ph type="title"/>
+          </p:nvPr>
+        </p:nvSpPr>
+        <p:spPr/>
+        <p:txBody>
+          <a:bodyPr/>
+          <a:lstStyle/>
+          <a:p>
+            <a:r>
+              <a:rPr lang="de-DE" dirty="0"/>
+              <a:t>Coq Basics</a:t>
+            </a:r>
+            <a:endParaRPr lang="en-US" dirty="0"/>
+          </a:p>
+        </p:txBody>
+      </p:sp>
+      <p:sp>
+        <p:nvSpPr>
+          <p:cNvPr id="3" name="Inhaltsplatzhalter 2">
+            <a:extLst>
+              <a:ext uri="{FF2B5EF4-FFF2-40B4-BE49-F238E27FC236}">
+                <a16:creationId xmlns:a16="http://schemas.microsoft.com/office/drawing/2014/main" id="{9F54BA48-13BB-474F-869A-BFC365DB3C8A}"/>
+              </a:ext>
+            </a:extLst>
+          </p:cNvPr>
+          <p:cNvSpPr>
+            <a:spLocks noGrp="1"/>
+          </p:cNvSpPr>
+          <p:nvPr>
+            <p:ph idx="1"/>
+          </p:nvPr>
+        </p:nvSpPr>
+        <p:spPr/>
+        <p:txBody>
+          <a:bodyPr/>
+          <a:lstStyle/>
+          <a:p>
+            <a:endParaRPr lang="en-US"/>
+          </a:p>
+        </p:txBody>
+      </p:sp>
+      <p:sp>
+        <p:nvSpPr>
+          <p:cNvPr id="4" name="Datumsplatzhalter 3">
+            <a:extLst>
+              <a:ext uri="{FF2B5EF4-FFF2-40B4-BE49-F238E27FC236}">
+                <a16:creationId xmlns:a16="http://schemas.microsoft.com/office/drawing/2014/main" id="{99B7E53F-EA43-4D13-9D0B-129F9186262A}"/>
+              </a:ext>
+            </a:extLst>
+          </p:cNvPr>
+          <p:cNvSpPr>
+            <a:spLocks noGrp="1"/>
+          </p:cNvSpPr>
+          <p:nvPr>
+            <p:ph type="dt" sz="half" idx="10"/>
+          </p:nvPr>
+        </p:nvSpPr>
+        <p:spPr/>
+        <p:txBody>
+          <a:bodyPr/>
+          <a:lstStyle/>
+          <a:p>
+            <a:r>
+              <a:rPr lang="de-DE"/>
+              <a:t>21/01/2020</a:t>
+            </a:r>
+            <a:endParaRPr lang="en-US"/>
+          </a:p>
+        </p:txBody>
+      </p:sp>
+    </p:spTree>
+    <p:extLst>
+      <p:ext uri="{BB962C8B-B14F-4D97-AF65-F5344CB8AC3E}">
+        <p14:creationId xmlns:p14="http://schemas.microsoft.com/office/powerpoint/2010/main" val="236195017"/>
+      </p:ext>
+    </p:extLst>
+  </p:cSld>
+  <p:clrMapOvr>
+    <a:masterClrMapping/>
+  </p:clrMapOvr>
+</p:sld>
+</file>
+
+<file path=ppt/slides/slide13.xml><?xml version="1.0" encoding="utf-8"?>
+<p:sld xmlns:a="http://schemas.openxmlformats.org/drawingml/2006/main" xmlns:r="http://schemas.openxmlformats.org/officeDocument/2006/relationships" xmlns:p="http://schemas.openxmlformats.org/presentationml/2006/main">
+  <p:cSld>
+    <p:spTree>
+      <p:nvGrpSpPr>
+        <p:cNvPr id="1" name=""/>
+        <p:cNvGrpSpPr/>
+        <p:nvPr/>
+      </p:nvGrpSpPr>
+      <p:grpSpPr>
+        <a:xfrm>
+          <a:off x="0" y="0"/>
+          <a:ext cx="0" cy="0"/>
+          <a:chOff x="0" y="0"/>
+          <a:chExt cx="0" cy="0"/>
+        </a:xfrm>
+      </p:grpSpPr>
+      <p:sp>
+        <p:nvSpPr>
+          <p:cNvPr id="2" name="Titel 1">
+            <a:extLst>
+              <a:ext uri="{FF2B5EF4-FFF2-40B4-BE49-F238E27FC236}">
+                <a16:creationId xmlns:a16="http://schemas.microsoft.com/office/drawing/2014/main" id="{D89984BC-AC1B-422F-A5D0-159C7FA158A1}"/>
+              </a:ext>
+            </a:extLst>
+          </p:cNvPr>
+          <p:cNvSpPr>
+            <a:spLocks noGrp="1"/>
+          </p:cNvSpPr>
+          <p:nvPr>
+            <p:ph type="title"/>
+          </p:nvPr>
+        </p:nvSpPr>
+        <p:spPr/>
+        <p:txBody>
+          <a:bodyPr/>
+          <a:lstStyle/>
+          <a:p>
+            <a:r>
+              <a:rPr lang="de-DE" dirty="0"/>
+              <a:t>Coq Beispiel</a:t>
+            </a:r>
+            <a:endParaRPr lang="en-US" dirty="0"/>
+          </a:p>
+        </p:txBody>
+      </p:sp>
+      <p:sp>
+        <p:nvSpPr>
+          <p:cNvPr id="3" name="Inhaltsplatzhalter 2">
+            <a:extLst>
+              <a:ext uri="{FF2B5EF4-FFF2-40B4-BE49-F238E27FC236}">
+                <a16:creationId xmlns:a16="http://schemas.microsoft.com/office/drawing/2014/main" id="{9F54BA48-13BB-474F-869A-BFC365DB3C8A}"/>
+              </a:ext>
+            </a:extLst>
+          </p:cNvPr>
+          <p:cNvSpPr>
+            <a:spLocks noGrp="1"/>
+          </p:cNvSpPr>
+          <p:nvPr>
+            <p:ph idx="1"/>
+          </p:nvPr>
+        </p:nvSpPr>
+        <p:spPr/>
+        <p:txBody>
+          <a:bodyPr/>
+          <a:lstStyle/>
+          <a:p>
+            <a:endParaRPr lang="en-US"/>
+          </a:p>
+        </p:txBody>
+      </p:sp>
+      <p:sp>
+        <p:nvSpPr>
+          <p:cNvPr id="4" name="Datumsplatzhalter 3">
+            <a:extLst>
+              <a:ext uri="{FF2B5EF4-FFF2-40B4-BE49-F238E27FC236}">
+                <a16:creationId xmlns:a16="http://schemas.microsoft.com/office/drawing/2014/main" id="{99B7E53F-EA43-4D13-9D0B-129F9186262A}"/>
+              </a:ext>
+            </a:extLst>
+          </p:cNvPr>
+          <p:cNvSpPr>
+            <a:spLocks noGrp="1"/>
+          </p:cNvSpPr>
+          <p:nvPr>
+            <p:ph type="dt" sz="half" idx="10"/>
+          </p:nvPr>
+        </p:nvSpPr>
+        <p:spPr/>
+        <p:txBody>
+          <a:bodyPr/>
+          <a:lstStyle/>
+          <a:p>
+            <a:r>
+              <a:rPr lang="de-DE"/>
+              <a:t>21/01/2020</a:t>
+            </a:r>
+            <a:endParaRPr lang="en-US"/>
+          </a:p>
+        </p:txBody>
+      </p:sp>
+    </p:spTree>
+    <p:extLst>
+      <p:ext uri="{BB962C8B-B14F-4D97-AF65-F5344CB8AC3E}">
+        <p14:creationId xmlns:p14="http://schemas.microsoft.com/office/powerpoint/2010/main" val="855517724"/>
+      </p:ext>
+    </p:extLst>
+  </p:cSld>
+  <p:clrMapOvr>
+    <a:masterClrMapping/>
+  </p:clrMapOvr>
+</p:sld>
+</file>
+
+<file path=ppt/slides/slide14.xml><?xml version="1.0" encoding="utf-8"?>
+<p:sld xmlns:a="http://schemas.openxmlformats.org/drawingml/2006/main" xmlns:r="http://schemas.openxmlformats.org/officeDocument/2006/relationships" xmlns:p="http://schemas.openxmlformats.org/presentationml/2006/main">
+  <p:cSld>
+    <p:spTree>
+      <p:nvGrpSpPr>
+        <p:cNvPr id="1" name=""/>
+        <p:cNvGrpSpPr/>
+        <p:nvPr/>
+      </p:nvGrpSpPr>
+      <p:grpSpPr>
+        <a:xfrm>
+          <a:off x="0" y="0"/>
+          <a:ext cx="0" cy="0"/>
+          <a:chOff x="0" y="0"/>
+          <a:chExt cx="0" cy="0"/>
+        </a:xfrm>
+      </p:grpSpPr>
+      <p:sp>
+        <p:nvSpPr>
+          <p:cNvPr id="2" name="Titel 1">
+            <a:extLst>
+              <a:ext uri="{FF2B5EF4-FFF2-40B4-BE49-F238E27FC236}">
+                <a16:creationId xmlns:a16="http://schemas.microsoft.com/office/drawing/2014/main" id="{D89984BC-AC1B-422F-A5D0-159C7FA158A1}"/>
+              </a:ext>
+            </a:extLst>
+          </p:cNvPr>
+          <p:cNvSpPr>
+            <a:spLocks noGrp="1"/>
+          </p:cNvSpPr>
+          <p:nvPr>
+            <p:ph type="title"/>
+          </p:nvPr>
+        </p:nvSpPr>
+        <p:spPr/>
+        <p:txBody>
+          <a:bodyPr/>
+          <a:lstStyle/>
+          <a:p>
+            <a:r>
               <a:rPr lang="de-DE" dirty="0"/>
               <a:t>Coq Beispiel</a:t>
             </a:r>
@@ -6921,7 +7363,7 @@
 </p:sld>
 </file>
 
-<file path=ppt/slides/slide12.xml><?xml version="1.0" encoding="utf-8"?>
+<file path=ppt/slides/slide15.xml><?xml version="1.0" encoding="utf-8"?>
 <p:sld xmlns:a="http://schemas.openxmlformats.org/drawingml/2006/main" xmlns:r="http://schemas.openxmlformats.org/officeDocument/2006/relationships" xmlns:p="http://schemas.openxmlformats.org/presentationml/2006/main">
   <p:cSld>
     <p:spTree>
@@ -9158,7 +9600,7 @@
           <a:p>
             <a:r>
               <a:rPr lang="de-DE" dirty="0"/>
-              <a:t>Coq Basics</a:t>
+              <a:t>Grundlagen formaler Verifikation von Programmcode</a:t>
             </a:r>
             <a:endParaRPr lang="en-US" dirty="0"/>
           </a:p>
@@ -9185,7 +9627,32 @@
           <a:bodyPr/>
           <a:lstStyle/>
           <a:p>
-            <a:endParaRPr lang="en-US"/>
+            <a:r>
+              <a:rPr lang="de-DE" dirty="0"/>
+              <a:t>Spezifikation: Was soll das System/die Funktion machen</a:t>
+            </a:r>
+          </a:p>
+          <a:p>
+            <a:pPr lvl="1"/>
+            <a:r>
+              <a:rPr lang="de-DE" dirty="0"/>
+              <a:t>System ist nur so gut, wie die Spezifikation selbst!</a:t>
+            </a:r>
+          </a:p>
+          <a:p>
+            <a:r>
+              <a:rPr lang="de-DE" dirty="0"/>
+              <a:t>Tool zum Beweisen einzelner Systemanforderungen</a:t>
+            </a:r>
+          </a:p>
+          <a:p>
+            <a:r>
+              <a:rPr lang="de-DE" dirty="0"/>
+              <a:t>Verbindung zwischen Programmcode und formalen Beweisen</a:t>
+            </a:r>
+          </a:p>
+          <a:p>
+            <a:endParaRPr lang="en-US" dirty="0"/>
           </a:p>
         </p:txBody>
       </p:sp>
@@ -9221,7 +9688,7 @@
     </p:spTree>
     <p:extLst>
       <p:ext uri="{BB962C8B-B14F-4D97-AF65-F5344CB8AC3E}">
-        <p14:creationId xmlns:p14="http://schemas.microsoft.com/office/powerpoint/2010/main" val="904615250"/>
+        <p14:creationId xmlns:p14="http://schemas.microsoft.com/office/powerpoint/2010/main" val="763671988"/>
       </p:ext>
     </p:extLst>
   </p:cSld>
@@ -9253,7 +9720,7 @@
           <p:cNvPr id="2" name="Titel 1">
             <a:extLst>
               <a:ext uri="{FF2B5EF4-FFF2-40B4-BE49-F238E27FC236}">
-                <a16:creationId xmlns:a16="http://schemas.microsoft.com/office/drawing/2014/main" id="{D89984BC-AC1B-422F-A5D0-159C7FA158A1}"/>
+                <a16:creationId xmlns:a16="http://schemas.microsoft.com/office/drawing/2014/main" id="{1BB66EA5-6D85-4FF6-8325-955AE8089A37}"/>
               </a:ext>
             </a:extLst>
           </p:cNvPr>
@@ -9271,7 +9738,7 @@
           <a:p>
             <a:r>
               <a:rPr lang="de-DE" dirty="0"/>
-              <a:t>Grundlagen formaler Verifikation</a:t>
+              <a:t>Das Tool für Beweise: Coq</a:t>
             </a:r>
             <a:endParaRPr lang="en-US" dirty="0"/>
           </a:p>
@@ -9282,7 +9749,7 @@
           <p:cNvPr id="3" name="Inhaltsplatzhalter 2">
             <a:extLst>
               <a:ext uri="{FF2B5EF4-FFF2-40B4-BE49-F238E27FC236}">
-                <a16:creationId xmlns:a16="http://schemas.microsoft.com/office/drawing/2014/main" id="{9F54BA48-13BB-474F-869A-BFC365DB3C8A}"/>
+                <a16:creationId xmlns:a16="http://schemas.microsoft.com/office/drawing/2014/main" id="{9112029A-EACE-43A5-A4D8-C12AD4394E0C}"/>
               </a:ext>
             </a:extLst>
           </p:cNvPr>
@@ -9300,9 +9767,33 @@
           <a:p>
             <a:r>
               <a:rPr lang="de-DE" dirty="0"/>
-              <a:t>Spezifikation</a:t>
-            </a:r>
-            <a:endParaRPr lang="en-US" dirty="0"/>
+              <a:t>ist eine Programmiersprache</a:t>
+            </a:r>
+          </a:p>
+          <a:p>
+            <a:r>
+              <a:rPr lang="de-DE" dirty="0"/>
+              <a:t>ist ein Proof </a:t>
+            </a:r>
+            <a:r>
+              <a:rPr lang="de-DE" dirty="0" err="1"/>
+              <a:t>Assistant</a:t>
+            </a:r>
+            <a:endParaRPr lang="de-DE" dirty="0"/>
+          </a:p>
+          <a:p>
+            <a:r>
+              <a:rPr lang="de-DE" dirty="0"/>
+              <a:t>hat eine integrierte IDE (</a:t>
+            </a:r>
+            <a:r>
+              <a:rPr lang="de-DE" dirty="0" err="1"/>
+              <a:t>CoqIDE</a:t>
+            </a:r>
+            <a:r>
+              <a:rPr lang="de-DE" dirty="0"/>
+              <a:t>)</a:t>
+            </a:r>
           </a:p>
         </p:txBody>
       </p:sp>
@@ -9311,7 +9802,7 @@
           <p:cNvPr id="4" name="Datumsplatzhalter 3">
             <a:extLst>
               <a:ext uri="{FF2B5EF4-FFF2-40B4-BE49-F238E27FC236}">
-                <a16:creationId xmlns:a16="http://schemas.microsoft.com/office/drawing/2014/main" id="{99B7E53F-EA43-4D13-9D0B-129F9186262A}"/>
+                <a16:creationId xmlns:a16="http://schemas.microsoft.com/office/drawing/2014/main" id="{D36E6D87-0F44-490B-A994-02641D08EABB}"/>
               </a:ext>
             </a:extLst>
           </p:cNvPr>
@@ -9338,7 +9829,7 @@
     </p:spTree>
     <p:extLst>
       <p:ext uri="{BB962C8B-B14F-4D97-AF65-F5344CB8AC3E}">
-        <p14:creationId xmlns:p14="http://schemas.microsoft.com/office/powerpoint/2010/main" val="763671988"/>
+        <p14:creationId xmlns:p14="http://schemas.microsoft.com/office/powerpoint/2010/main" val="946040787"/>
       </p:ext>
     </p:extLst>
   </p:cSld>

</xml_diff>